<commit_message>
complete powerpoint and finish project03
</commit_message>
<xml_diff>
--- a/21851452刘丽锋/读书报告/presentation.pptx
+++ b/21851452刘丽锋/读书报告/presentation.pptx
@@ -242,7 +242,7 @@
           <a:p>
             <a:fld id="{962EF116-D5FC-4F8F-998E-A9C129060160}" type="datetimeFigureOut">
               <a:rPr lang="zh-CN" altLang="en-US" smtClean="0"/>
-              <a:t>2018/12/31</a:t>
+              <a:t>2019/1/11</a:t>
             </a:fld>
             <a:endParaRPr lang="zh-CN" altLang="en-US"/>
           </a:p>
@@ -3158,7 +3158,7 @@
           <a:p>
             <a:fld id="{60FCB084-51A8-4949-8ADD-2ED30B1DC960}" type="datetimeFigureOut">
               <a:rPr lang="zh-CN" altLang="en-US" smtClean="0"/>
-              <a:t>2018/12/31</a:t>
+              <a:t>2019/1/11</a:t>
             </a:fld>
             <a:endParaRPr lang="zh-CN" altLang="en-US"/>
           </a:p>
@@ -3278,7 +3278,7 @@
             <a:fld id="{2702115E-07FC-47AE-8678-8B681C689199}" type="datetimeFigureOut">
               <a:rPr lang="zh-CN" altLang="en-US" smtClean="0"/>
               <a:pPr/>
-              <a:t>2018/12/31</a:t>
+              <a:t>2019/1/11</a:t>
             </a:fld>
             <a:endParaRPr lang="zh-CN" altLang="en-US"/>
           </a:p>
@@ -3936,7 +3936,7 @@
             <a:fld id="{2702115E-07FC-47AE-8678-8B681C689199}" type="datetimeFigureOut">
               <a:rPr lang="zh-CN" altLang="en-US" smtClean="0"/>
               <a:pPr/>
-              <a:t>2018/12/31</a:t>
+              <a:t>2019/1/11</a:t>
             </a:fld>
             <a:endParaRPr lang="zh-CN" altLang="en-US"/>
           </a:p>
@@ -4797,7 +4797,7 @@
           <a:p>
             <a:fld id="{60FCB084-51A8-4949-8ADD-2ED30B1DC960}" type="datetimeFigureOut">
               <a:rPr lang="zh-CN" altLang="en-US" smtClean="0"/>
-              <a:t>2018/12/31</a:t>
+              <a:t>2019/1/11</a:t>
             </a:fld>
             <a:endParaRPr lang="zh-CN" altLang="en-US"/>
           </a:p>
@@ -5097,7 +5097,7 @@
           <a:p>
             <a:fld id="{60FCB084-51A8-4949-8ADD-2ED30B1DC960}" type="datetimeFigureOut">
               <a:rPr lang="zh-CN" altLang="en-US" smtClean="0"/>
-              <a:t>2018/12/31</a:t>
+              <a:t>2019/1/11</a:t>
             </a:fld>
             <a:endParaRPr lang="zh-CN" altLang="en-US"/>
           </a:p>
@@ -5307,7 +5307,7 @@
           <a:p>
             <a:fld id="{60FCB084-51A8-4949-8ADD-2ED30B1DC960}" type="datetimeFigureOut">
               <a:rPr lang="zh-CN" altLang="en-US" smtClean="0"/>
-              <a:t>2018/12/31</a:t>
+              <a:t>2019/1/11</a:t>
             </a:fld>
             <a:endParaRPr lang="zh-CN" altLang="en-US"/>
           </a:p>
@@ -5527,7 +5527,7 @@
           <a:p>
             <a:fld id="{60FCB084-51A8-4949-8ADD-2ED30B1DC960}" type="datetimeFigureOut">
               <a:rPr lang="zh-CN" altLang="en-US" smtClean="0"/>
-              <a:t>2018/12/31</a:t>
+              <a:t>2019/1/11</a:t>
             </a:fld>
             <a:endParaRPr lang="zh-CN" altLang="en-US"/>
           </a:p>
@@ -6456,7 +6456,7 @@
           <a:p>
             <a:fld id="{60FCB084-51A8-4949-8ADD-2ED30B1DC960}" type="datetimeFigureOut">
               <a:rPr lang="zh-CN" altLang="en-US" smtClean="0"/>
-              <a:t>2018/12/31</a:t>
+              <a:t>2019/1/11</a:t>
             </a:fld>
             <a:endParaRPr lang="zh-CN" altLang="en-US"/>
           </a:p>
@@ -6743,7 +6743,7 @@
           <a:p>
             <a:fld id="{60FCB084-51A8-4949-8ADD-2ED30B1DC960}" type="datetimeFigureOut">
               <a:rPr lang="zh-CN" altLang="en-US" smtClean="0"/>
-              <a:t>2018/12/31</a:t>
+              <a:t>2019/1/11</a:t>
             </a:fld>
             <a:endParaRPr lang="zh-CN" altLang="en-US"/>
           </a:p>
@@ -7020,7 +7020,7 @@
           <a:p>
             <a:fld id="{60FCB084-51A8-4949-8ADD-2ED30B1DC960}" type="datetimeFigureOut">
               <a:rPr lang="zh-CN" altLang="en-US" smtClean="0"/>
-              <a:t>2018/12/31</a:t>
+              <a:t>2019/1/11</a:t>
             </a:fld>
             <a:endParaRPr lang="zh-CN" altLang="en-US"/>
           </a:p>
@@ -7444,7 +7444,7 @@
           <a:p>
             <a:fld id="{60FCB084-51A8-4949-8ADD-2ED30B1DC960}" type="datetimeFigureOut">
               <a:rPr lang="zh-CN" altLang="en-US" smtClean="0"/>
-              <a:t>2018/12/31</a:t>
+              <a:t>2019/1/11</a:t>
             </a:fld>
             <a:endParaRPr lang="zh-CN" altLang="en-US"/>
           </a:p>
@@ -7597,7 +7597,7 @@
           <a:p>
             <a:fld id="{60FCB084-51A8-4949-8ADD-2ED30B1DC960}" type="datetimeFigureOut">
               <a:rPr lang="zh-CN" altLang="en-US" smtClean="0"/>
-              <a:t>2018/12/31</a:t>
+              <a:t>2019/1/11</a:t>
             </a:fld>
             <a:endParaRPr lang="zh-CN" altLang="en-US"/>
           </a:p>
@@ -7722,7 +7722,7 @@
           <a:p>
             <a:fld id="{60FCB084-51A8-4949-8ADD-2ED30B1DC960}" type="datetimeFigureOut">
               <a:rPr lang="zh-CN" altLang="en-US" smtClean="0"/>
-              <a:t>2018/12/31</a:t>
+              <a:t>2019/1/11</a:t>
             </a:fld>
             <a:endParaRPr lang="zh-CN" altLang="en-US"/>
           </a:p>
@@ -8399,7 +8399,7 @@
             <a:fld id="{2702115E-07FC-47AE-8678-8B681C689199}" type="datetimeFigureOut">
               <a:rPr lang="zh-CN" altLang="en-US" smtClean="0"/>
               <a:pPr/>
-              <a:t>2018/12/31</a:t>
+              <a:t>2019/1/11</a:t>
             </a:fld>
             <a:endParaRPr lang="zh-CN" altLang="en-US"/>
           </a:p>
@@ -9055,7 +9055,7 @@
             <a:fld id="{2702115E-07FC-47AE-8678-8B681C689199}" type="datetimeFigureOut">
               <a:rPr lang="zh-CN" altLang="en-US" smtClean="0"/>
               <a:pPr/>
-              <a:t>2018/12/31</a:t>
+              <a:t>2019/1/11</a:t>
             </a:fld>
             <a:endParaRPr lang="zh-CN" altLang="en-US"/>
           </a:p>
@@ -9873,7 +9873,7 @@
           <a:p>
             <a:fld id="{60FCB084-51A8-4949-8ADD-2ED30B1DC960}" type="datetimeFigureOut">
               <a:rPr lang="zh-CN" altLang="en-US" smtClean="0"/>
-              <a:t>2018/12/31</a:t>
+              <a:t>2019/1/11</a:t>
             </a:fld>
             <a:endParaRPr lang="zh-CN" altLang="en-US"/>
           </a:p>
@@ -11438,10 +11438,10 @@
       </p:sp>
       <p:pic>
         <p:nvPicPr>
-          <p:cNvPr id="7" name="图片 6">
+          <p:cNvPr id="3" name="图片 2">
             <a:extLst>
               <a:ext uri="{FF2B5EF4-FFF2-40B4-BE49-F238E27FC236}">
-                <a16:creationId xmlns:a16="http://schemas.microsoft.com/office/drawing/2014/main" id="{4521044F-158D-8F4F-8FAF-E5CF1D5B7BE9}"/>
+                <a16:creationId xmlns:a16="http://schemas.microsoft.com/office/drawing/2014/main" id="{2EBEA4E3-62A8-A144-BE91-E242E0BF74B1}"/>
               </a:ext>
             </a:extLst>
           </p:cNvPr>
@@ -11458,8 +11458,8 @@
         </p:blipFill>
         <p:spPr>
           <a:xfrm>
-            <a:off x="2112811" y="3469188"/>
-            <a:ext cx="8216900" cy="3276600"/>
+            <a:off x="2525561" y="1807134"/>
+            <a:ext cx="7391400" cy="1511300"/>
           </a:xfrm>
           <a:prstGeom prst="rect">
             <a:avLst/>
@@ -11468,10 +11468,10 @@
       </p:pic>
       <p:pic>
         <p:nvPicPr>
-          <p:cNvPr id="3" name="图片 2">
+          <p:cNvPr id="4" name="图片 3">
             <a:extLst>
               <a:ext uri="{FF2B5EF4-FFF2-40B4-BE49-F238E27FC236}">
-                <a16:creationId xmlns:a16="http://schemas.microsoft.com/office/drawing/2014/main" id="{2EBEA4E3-62A8-A144-BE91-E242E0BF74B1}"/>
+                <a16:creationId xmlns:a16="http://schemas.microsoft.com/office/drawing/2014/main" id="{7EC30892-37A3-2146-9018-833210A16D78}"/>
               </a:ext>
             </a:extLst>
           </p:cNvPr>
@@ -11488,8 +11488,8 @@
         </p:blipFill>
         <p:spPr>
           <a:xfrm>
-            <a:off x="2525561" y="1807134"/>
-            <a:ext cx="7391400" cy="1511300"/>
+            <a:off x="2046816" y="3469187"/>
+            <a:ext cx="7963357" cy="2760133"/>
           </a:xfrm>
           <a:prstGeom prst="rect">
             <a:avLst/>
@@ -11605,8 +11605,38 @@
         </p:blipFill>
         <p:spPr>
           <a:xfrm>
-            <a:off x="1038355" y="1940055"/>
+            <a:off x="4695955" y="1656381"/>
             <a:ext cx="2324100" cy="673100"/>
+          </a:xfrm>
+          <a:prstGeom prst="rect">
+            <a:avLst/>
+          </a:prstGeom>
+        </p:spPr>
+      </p:pic>
+      <p:pic>
+        <p:nvPicPr>
+          <p:cNvPr id="3" name="图片 2">
+            <a:extLst>
+              <a:ext uri="{FF2B5EF4-FFF2-40B4-BE49-F238E27FC236}">
+                <a16:creationId xmlns:a16="http://schemas.microsoft.com/office/drawing/2014/main" id="{16C54B3E-8013-6641-A765-745C4E8A3422}"/>
+              </a:ext>
+            </a:extLst>
+          </p:cNvPr>
+          <p:cNvPicPr>
+            <a:picLocks noChangeAspect="1"/>
+          </p:cNvPicPr>
+          <p:nvPr/>
+        </p:nvPicPr>
+        <p:blipFill>
+          <a:blip r:embed="rId3"/>
+          <a:stretch>
+            <a:fillRect/>
+          </a:stretch>
+        </p:blipFill>
+        <p:spPr>
+          <a:xfrm>
+            <a:off x="211667" y="2724150"/>
+            <a:ext cx="11734800" cy="2374900"/>
           </a:xfrm>
           <a:prstGeom prst="rect">
             <a:avLst/>

</xml_diff>